<commit_message>
Deployed 481495d with MkDocs version: 1.3.0
</commit_message>
<xml_diff>
--- a/en/week-5/ce204-week-5.en.md_word.pptx
+++ b/en/week-5/ce204-week-5.en.md_word.pptx
@@ -18658,8 +18658,8 @@
         </p:blipFill>
         <p:spPr bwMode="auto">
           <a:xfrm>
-            <a:off x="457200" y="3200400"/>
-            <a:ext cx="8229600" cy="812800"/>
+            <a:off x="457200" y="3187700"/>
+            <a:ext cx="8229600" cy="850900"/>
           </a:xfrm>
           <a:prstGeom prst="rect">
             <a:avLst/>
@@ -24341,7 +24341,7 @@
               <a:rPr>
                 <a:hlinkClick r:id="rId2"/>
               </a:rPr>
-              <a:t>DOC</a:t>
+              <a:t>DOC-PDF</a:t>
             </a:r>
             <a:r>
               <a:rPr/>
@@ -24351,6 +24351,16 @@
               <a:rPr>
                 <a:hlinkClick r:id="rId3"/>
               </a:rPr>
+              <a:t>DOC-DOCX</a:t>
+            </a:r>
+            <a:r>
+              <a:rPr/>
+              <a:t>, </a:t>
+            </a:r>
+            <a:r>
+              <a:rPr>
+                <a:hlinkClick r:id="rId4"/>
+              </a:rPr>
               <a:t>SLIDE</a:t>
             </a:r>
             <a:r>
@@ -24359,9 +24369,13 @@
             </a:r>
             <a:r>
               <a:rPr>
-                <a:hlinkClick r:id="rId4"/>
+                <a:hlinkClick r:id="rId5"/>
               </a:rPr>
               <a:t>PPTX</a:t>
+            </a:r>
+            <a:r>
+              <a:rPr/>
+              <a:t>,</a:t>
             </a:r>
           </a:p>
         </p:txBody>

</xml_diff>